<commit_message>
changes made to composer bot and ppt
</commit_message>
<xml_diff>
--- a/Ecommerce design poc.pptx
+++ b/Ecommerce design poc.pptx
@@ -9,16 +9,17 @@
     <p:sldMasterId id="2147483689" r:id="rId8"/>
   </p:sldMasterIdLst>
   <p:notesMasterIdLst>
-    <p:notesMasterId r:id="rId13"/>
+    <p:notesMasterId r:id="rId14"/>
   </p:notesMasterIdLst>
   <p:handoutMasterIdLst>
-    <p:handoutMasterId r:id="rId14"/>
+    <p:handoutMasterId r:id="rId15"/>
   </p:handoutMasterIdLst>
   <p:sldIdLst>
     <p:sldId id="429" r:id="rId9"/>
     <p:sldId id="451" r:id="rId10"/>
-    <p:sldId id="450" r:id="rId11"/>
-    <p:sldId id="309" r:id="rId12"/>
+    <p:sldId id="452" r:id="rId11"/>
+    <p:sldId id="450" r:id="rId12"/>
+    <p:sldId id="309" r:id="rId13"/>
   </p:sldIdLst>
   <p:sldSz cx="9144000" cy="5143500" type="screen16x9"/>
   <p:notesSz cx="7010400" cy="9236075"/>
@@ -1245,7 +1246,7 @@
               <a:pPr>
                 <a:defRPr/>
               </a:pPr>
-              <a:t>4</a:t>
+              <a:t>5</a:t>
             </a:fld>
             <a:endParaRPr lang="en-US" dirty="0">
               <a:solidFill>
@@ -4194,7 +4195,7 @@
             <a:fld id="{14E39C5E-3938-484F-9F2C-43A53F2F2C23}" type="datetimeFigureOut">
               <a:rPr lang="en-US" smtClean="0"/>
               <a:pPr/>
-              <a:t>3/15/2021</a:t>
+              <a:t>3/18/2021</a:t>
             </a:fld>
             <a:endParaRPr lang="en-US"/>
           </a:p>
@@ -16504,6 +16505,184 @@
           <p:cNvPr id="2" name="Content Placeholder 1">
             <a:extLst>
               <a:ext uri="{FF2B5EF4-FFF2-40B4-BE49-F238E27FC236}">
+                <a16:creationId xmlns:a16="http://schemas.microsoft.com/office/drawing/2014/main" id="{9ECBF60F-5103-4EB1-AD8A-439446C3AADB}"/>
+              </a:ext>
+            </a:extLst>
+          </p:cNvPr>
+          <p:cNvSpPr>
+            <a:spLocks noGrp="1"/>
+          </p:cNvSpPr>
+          <p:nvPr>
+            <p:ph idx="1"/>
+          </p:nvPr>
+        </p:nvSpPr>
+        <p:spPr/>
+        <p:txBody>
+          <a:bodyPr/>
+          <a:lstStyle/>
+          <a:p>
+            <a:r>
+              <a:rPr lang="en-IN" dirty="0"/>
+              <a:t>Norma is an Virtual Assistant for an Ecommerce Platform</a:t>
+            </a:r>
+          </a:p>
+          <a:p>
+            <a:r>
+              <a:rPr lang="en-IN" dirty="0"/>
+              <a:t>She is very smart and can assist user in 3 different ways:</a:t>
+            </a:r>
+          </a:p>
+          <a:p>
+            <a:pPr marL="0" indent="0">
+              <a:buNone/>
+            </a:pPr>
+            <a:endParaRPr lang="en-IN" dirty="0"/>
+          </a:p>
+          <a:p>
+            <a:pPr marL="342900" indent="-342900">
+              <a:buFont typeface="+mj-lt"/>
+              <a:buAutoNum type="arabicPeriod"/>
+            </a:pPr>
+            <a:r>
+              <a:rPr lang="en-IN" b="1" dirty="0"/>
+              <a:t>Order Management</a:t>
+            </a:r>
+            <a:r>
+              <a:rPr lang="en-IN" dirty="0"/>
+              <a:t>:  This functionality of VA allows user to track the status of their orders or 	            cancel them.</a:t>
+            </a:r>
+          </a:p>
+          <a:p>
+            <a:pPr marL="342900" indent="-342900">
+              <a:buFont typeface="+mj-lt"/>
+              <a:buAutoNum type="arabicPeriod"/>
+            </a:pPr>
+            <a:r>
+              <a:rPr lang="en-IN" b="1" dirty="0"/>
+              <a:t>Complaint Management</a:t>
+            </a:r>
+            <a:r>
+              <a:rPr lang="en-IN" dirty="0"/>
+              <a:t>: This functionality of VA allows user to create complaint tickets and tack 	                   them in case of any issue they face</a:t>
+            </a:r>
+          </a:p>
+          <a:p>
+            <a:pPr marL="342900" indent="-342900">
+              <a:buFont typeface="+mj-lt"/>
+              <a:buAutoNum type="arabicPeriod"/>
+            </a:pPr>
+            <a:r>
+              <a:rPr lang="en-IN" b="1" dirty="0"/>
+              <a:t>FAQ</a:t>
+            </a:r>
+            <a:r>
+              <a:rPr lang="en-IN" dirty="0"/>
+              <a:t>: This feature allows the user to communicate with the user with any query they may have and                       bot resolves them smartly using the prepopulated Question answers stored in their Knowledge base</a:t>
+            </a:r>
+          </a:p>
+          <a:p>
+            <a:pPr marL="342900" indent="-342900">
+              <a:buFont typeface="+mj-lt"/>
+              <a:buAutoNum type="arabicPeriod"/>
+            </a:pPr>
+            <a:endParaRPr lang="en-IN" dirty="0"/>
+          </a:p>
+        </p:txBody>
+      </p:sp>
+      <p:sp>
+        <p:nvSpPr>
+          <p:cNvPr id="3" name="Title 2">
+            <a:extLst>
+              <a:ext uri="{FF2B5EF4-FFF2-40B4-BE49-F238E27FC236}">
+                <a16:creationId xmlns:a16="http://schemas.microsoft.com/office/drawing/2014/main" id="{C2E3AB57-59D5-47A1-995F-181CD054E37E}"/>
+              </a:ext>
+            </a:extLst>
+          </p:cNvPr>
+          <p:cNvSpPr>
+            <a:spLocks noGrp="1"/>
+          </p:cNvSpPr>
+          <p:nvPr>
+            <p:ph type="title"/>
+          </p:nvPr>
+        </p:nvSpPr>
+        <p:spPr>
+          <a:xfrm>
+            <a:off x="269878" y="240427"/>
+            <a:ext cx="8024283" cy="307777"/>
+          </a:xfrm>
+        </p:spPr>
+        <p:txBody>
+          <a:bodyPr/>
+          <a:lstStyle/>
+          <a:p>
+            <a:r>
+              <a:rPr lang="en-US" dirty="0"/>
+              <a:t>Ecommerce Bot POC</a:t>
+            </a:r>
+            <a:endParaRPr lang="en-IN" dirty="0"/>
+          </a:p>
+        </p:txBody>
+      </p:sp>
+      <p:sp>
+        <p:nvSpPr>
+          <p:cNvPr id="4" name="Content Placeholder 3">
+            <a:extLst>
+              <a:ext uri="{FF2B5EF4-FFF2-40B4-BE49-F238E27FC236}">
+                <a16:creationId xmlns:a16="http://schemas.microsoft.com/office/drawing/2014/main" id="{A1F33E81-9289-40D8-8DB9-38847B50A2B1}"/>
+              </a:ext>
+            </a:extLst>
+          </p:cNvPr>
+          <p:cNvSpPr>
+            <a:spLocks noGrp="1"/>
+          </p:cNvSpPr>
+          <p:nvPr>
+            <p:ph sz="quarter" idx="10"/>
+          </p:nvPr>
+        </p:nvSpPr>
+        <p:spPr/>
+        <p:txBody>
+          <a:bodyPr/>
+          <a:lstStyle/>
+          <a:p>
+            <a:endParaRPr lang="en-IN"/>
+          </a:p>
+        </p:txBody>
+      </p:sp>
+    </p:spTree>
+    <p:extLst>
+      <p:ext uri="{BB962C8B-B14F-4D97-AF65-F5344CB8AC3E}">
+        <p14:creationId xmlns:p14="http://schemas.microsoft.com/office/powerpoint/2010/main" val="1290705162"/>
+      </p:ext>
+    </p:extLst>
+  </p:cSld>
+  <p:clrMapOvr>
+    <a:masterClrMapping/>
+  </p:clrMapOvr>
+</p:sld>
+</file>
+
+<file path=ppt/slides/slide4.xml><?xml version="1.0" encoding="utf-8"?>
+<p:sld xmlns:a="http://schemas.openxmlformats.org/drawingml/2006/main" xmlns:r="http://schemas.openxmlformats.org/officeDocument/2006/relationships" xmlns:p="http://schemas.openxmlformats.org/presentationml/2006/main">
+  <p:cSld>
+    <p:spTree>
+      <p:nvGrpSpPr>
+        <p:cNvPr id="1" name=""/>
+        <p:cNvGrpSpPr/>
+        <p:nvPr/>
+      </p:nvGrpSpPr>
+      <p:grpSpPr>
+        <a:xfrm>
+          <a:off x="0" y="0"/>
+          <a:ext cx="0" cy="0"/>
+          <a:chOff x="0" y="0"/>
+          <a:chExt cx="0" cy="0"/>
+        </a:xfrm>
+      </p:grpSpPr>
+      <p:sp>
+        <p:nvSpPr>
+          <p:cNvPr id="2" name="Content Placeholder 1">
+            <a:extLst>
+              <a:ext uri="{FF2B5EF4-FFF2-40B4-BE49-F238E27FC236}">
                 <a16:creationId xmlns:a16="http://schemas.microsoft.com/office/drawing/2014/main" id="{7373E5E2-0F1D-400D-9672-408229875174}"/>
               </a:ext>
             </a:extLst>
@@ -16598,7 +16777,7 @@
 </p:sld>
 </file>
 
-<file path=ppt/slides/slide4.xml><?xml version="1.0" encoding="utf-8"?>
+<file path=ppt/slides/slide5.xml><?xml version="1.0" encoding="utf-8"?>
 <p:sld xmlns:a="http://schemas.openxmlformats.org/drawingml/2006/main" xmlns:r="http://schemas.openxmlformats.org/officeDocument/2006/relationships" xmlns:p="http://schemas.openxmlformats.org/presentationml/2006/main">
   <p:cSld>
     <p:spTree>
@@ -19339,12 +19518,6 @@
 </file>
 
 <file path=customXml/item2.xml><?xml version="1.0" encoding="utf-8"?>
-<p:properties xmlns:p="http://schemas.microsoft.com/office/2006/metadata/properties" xmlns:xsi="http://www.w3.org/2001/XMLSchema-instance">
-  <documentManagement/>
-</p:properties>
-</file>
-
-<file path=customXml/item3.xml><?xml version="1.0" encoding="utf-8"?>
 <ct:contentTypeSchema xmlns:ct="http://schemas.microsoft.com/office/2006/metadata/contentType" xmlns:ma="http://schemas.microsoft.com/office/2006/metadata/properties/metaAttributes" ct:_="" ma:_="" ma:contentTypeName="Document" ma:contentTypeID="0x0101008BB793523489144692F642438647A90B" ma:contentTypeVersion="9" ma:contentTypeDescription="Create a new document." ma:contentTypeScope="" ma:versionID="672fbe5a40bdf63a285672db21c905ef">
   <xsd:schema xmlns:xsd="http://www.w3.org/2001/XMLSchema" xmlns:xs="http://www.w3.org/2001/XMLSchema" xmlns:p="http://schemas.microsoft.com/office/2006/metadata/properties" xmlns:ns2="ab2fee6a-08d5-4e21-8f75-6aa7d52dd912" xmlns:ns3="4ff20c20-38b2-49e5-b553-eeb0028eb2de" targetNamespace="http://schemas.microsoft.com/office/2006/metadata/properties" ma:root="true" ma:fieldsID="80f5e4687c6f0355c91c24f99d7c825c" ns2:_="" ns3:_="">
     <xsd:import namespace="ab2fee6a-08d5-4e21-8f75-6aa7d52dd912"/>
@@ -19535,6 +19708,12 @@
 </ct:contentTypeSchema>
 </file>
 
+<file path=customXml/item3.xml><?xml version="1.0" encoding="utf-8"?>
+<p:properties xmlns:p="http://schemas.microsoft.com/office/2006/metadata/properties" xmlns:xsi="http://www.w3.org/2001/XMLSchema-instance">
+  <documentManagement/>
+</p:properties>
+</file>
+
 <file path=customXml/itemProps1.xml><?xml version="1.0" encoding="utf-8"?>
 <ds:datastoreItem xmlns:ds="http://schemas.openxmlformats.org/officeDocument/2006/customXml" ds:itemID="{8ABB6DC8-0142-4676-96FE-F1693BA95046}">
   <ds:schemaRefs>
@@ -19544,23 +19723,6 @@
 </file>
 
 <file path=customXml/itemProps2.xml><?xml version="1.0" encoding="utf-8"?>
-<ds:datastoreItem xmlns:ds="http://schemas.openxmlformats.org/officeDocument/2006/customXml" ds:itemID="{24559248-63FA-4C6E-A37D-96FF4426E5C5}">
-  <ds:schemaRefs>
-    <ds:schemaRef ds:uri="http://purl.org/dc/terms/"/>
-    <ds:schemaRef ds:uri="http://purl.org/dc/dcmitype/"/>
-    <ds:schemaRef ds:uri="http://schemas.microsoft.com/office/infopath/2007/PartnerControls"/>
-    <ds:schemaRef ds:uri="http://www.w3.org/XML/1998/namespace"/>
-    <ds:schemaRef ds:uri="http://purl.org/dc/elements/1.1/"/>
-    <ds:schemaRef ds:uri="http://schemas.openxmlformats.org/package/2006/metadata/core-properties"/>
-    <ds:schemaRef ds:uri="http://schemas.microsoft.com/office/2006/documentManagement/types"/>
-    <ds:schemaRef ds:uri="4ff20c20-38b2-49e5-b553-eeb0028eb2de"/>
-    <ds:schemaRef ds:uri="ab2fee6a-08d5-4e21-8f75-6aa7d52dd912"/>
-    <ds:schemaRef ds:uri="http://schemas.microsoft.com/office/2006/metadata/properties"/>
-  </ds:schemaRefs>
-</ds:datastoreItem>
-</file>
-
-<file path=customXml/itemProps3.xml><?xml version="1.0" encoding="utf-8"?>
 <ds:datastoreItem xmlns:ds="http://schemas.openxmlformats.org/officeDocument/2006/customXml" ds:itemID="{397AA304-1829-4710-8D7A-6FFE62C6465B}">
   <ds:schemaRefs>
     <ds:schemaRef ds:uri="http://schemas.microsoft.com/office/2006/metadata/contentType"/>
@@ -19577,4 +19739,21 @@
     <ds:schemaRef ds:uri="http://schemas.microsoft.com/internal/obd"/>
   </ds:schemaRefs>
 </ds:datastoreItem>
+</file>
+
+<file path=customXml/itemProps3.xml><?xml version="1.0" encoding="utf-8"?>
+<ds:datastoreItem xmlns:ds="http://schemas.openxmlformats.org/officeDocument/2006/customXml" ds:itemID="{24559248-63FA-4C6E-A37D-96FF4426E5C5}">
+  <ds:schemaRefs>
+    <ds:schemaRef ds:uri="http://purl.org/dc/terms/"/>
+    <ds:schemaRef ds:uri="http://purl.org/dc/dcmitype/"/>
+    <ds:schemaRef ds:uri="http://schemas.microsoft.com/office/infopath/2007/PartnerControls"/>
+    <ds:schemaRef ds:uri="http://www.w3.org/XML/1998/namespace"/>
+    <ds:schemaRef ds:uri="http://purl.org/dc/elements/1.1/"/>
+    <ds:schemaRef ds:uri="http://schemas.openxmlformats.org/package/2006/metadata/core-properties"/>
+    <ds:schemaRef ds:uri="http://schemas.microsoft.com/office/2006/documentManagement/types"/>
+    <ds:schemaRef ds:uri="4ff20c20-38b2-49e5-b553-eeb0028eb2de"/>
+    <ds:schemaRef ds:uri="ab2fee6a-08d5-4e21-8f75-6aa7d52dd912"/>
+    <ds:schemaRef ds:uri="http://schemas.microsoft.com/office/2006/metadata/properties"/>
+  </ds:schemaRefs>
+</ds:datastoreItem>
 </file>
</xml_diff>